<commit_message>
Bug fixes and add neptune
</commit_message>
<xml_diff>
--- a/documents/Darpa presentation Devdhar.pptx
+++ b/documents/Darpa presentation Devdhar.pptx
@@ -264,7 +264,7 @@
           <a:p>
             <a:fld id="{8364651D-8E56-394A-ACC1-5DA22AECD1BE}" type="datetimeFigureOut">
               <a:rPr lang="en-US" smtClean="0"/>
-              <a:t>1/17/2022</a:t>
+              <a:t>2/24/2022</a:t>
             </a:fld>
             <a:endParaRPr lang="en-US"/>
           </a:p>
@@ -462,7 +462,7 @@
           <a:p>
             <a:fld id="{8364651D-8E56-394A-ACC1-5DA22AECD1BE}" type="datetimeFigureOut">
               <a:rPr lang="en-US" smtClean="0"/>
-              <a:t>1/17/2022</a:t>
+              <a:t>2/24/2022</a:t>
             </a:fld>
             <a:endParaRPr lang="en-US"/>
           </a:p>
@@ -670,7 +670,7 @@
           <a:p>
             <a:fld id="{8364651D-8E56-394A-ACC1-5DA22AECD1BE}" type="datetimeFigureOut">
               <a:rPr lang="en-US" smtClean="0"/>
-              <a:t>1/17/2022</a:t>
+              <a:t>2/24/2022</a:t>
             </a:fld>
             <a:endParaRPr lang="en-US"/>
           </a:p>
@@ -1141,7 +1141,7 @@
           <a:p>
             <a:fld id="{8364651D-8E56-394A-ACC1-5DA22AECD1BE}" type="datetimeFigureOut">
               <a:rPr lang="en-US" smtClean="0"/>
-              <a:t>1/17/2022</a:t>
+              <a:t>2/24/2022</a:t>
             </a:fld>
             <a:endParaRPr lang="en-US"/>
           </a:p>
@@ -1416,7 +1416,7 @@
           <a:p>
             <a:fld id="{8364651D-8E56-394A-ACC1-5DA22AECD1BE}" type="datetimeFigureOut">
               <a:rPr lang="en-US" smtClean="0"/>
-              <a:t>1/17/2022</a:t>
+              <a:t>2/24/2022</a:t>
             </a:fld>
             <a:endParaRPr lang="en-US"/>
           </a:p>
@@ -1681,7 +1681,7 @@
           <a:p>
             <a:fld id="{8364651D-8E56-394A-ACC1-5DA22AECD1BE}" type="datetimeFigureOut">
               <a:rPr lang="en-US" smtClean="0"/>
-              <a:t>1/17/2022</a:t>
+              <a:t>2/24/2022</a:t>
             </a:fld>
             <a:endParaRPr lang="en-US"/>
           </a:p>
@@ -2093,7 +2093,7 @@
           <a:p>
             <a:fld id="{8364651D-8E56-394A-ACC1-5DA22AECD1BE}" type="datetimeFigureOut">
               <a:rPr lang="en-US" smtClean="0"/>
-              <a:t>1/17/2022</a:t>
+              <a:t>2/24/2022</a:t>
             </a:fld>
             <a:endParaRPr lang="en-US"/>
           </a:p>
@@ -2234,7 +2234,7 @@
           <a:p>
             <a:fld id="{8364651D-8E56-394A-ACC1-5DA22AECD1BE}" type="datetimeFigureOut">
               <a:rPr lang="en-US" smtClean="0"/>
-              <a:t>1/17/2022</a:t>
+              <a:t>2/24/2022</a:t>
             </a:fld>
             <a:endParaRPr lang="en-US"/>
           </a:p>
@@ -2347,7 +2347,7 @@
           <a:p>
             <a:fld id="{8364651D-8E56-394A-ACC1-5DA22AECD1BE}" type="datetimeFigureOut">
               <a:rPr lang="en-US" smtClean="0"/>
-              <a:t>1/17/2022</a:t>
+              <a:t>2/24/2022</a:t>
             </a:fld>
             <a:endParaRPr lang="en-US"/>
           </a:p>
@@ -2658,7 +2658,7 @@
           <a:p>
             <a:fld id="{8364651D-8E56-394A-ACC1-5DA22AECD1BE}" type="datetimeFigureOut">
               <a:rPr lang="en-US" smtClean="0"/>
-              <a:t>1/17/2022</a:t>
+              <a:t>2/24/2022</a:t>
             </a:fld>
             <a:endParaRPr lang="en-US"/>
           </a:p>
@@ -2946,7 +2946,7 @@
           <a:p>
             <a:fld id="{8364651D-8E56-394A-ACC1-5DA22AECD1BE}" type="datetimeFigureOut">
               <a:rPr lang="en-US" smtClean="0"/>
-              <a:t>1/17/2022</a:t>
+              <a:t>2/24/2022</a:t>
             </a:fld>
             <a:endParaRPr lang="en-US"/>
           </a:p>
@@ -3187,7 +3187,7 @@
           <a:p>
             <a:fld id="{8364651D-8E56-394A-ACC1-5DA22AECD1BE}" type="datetimeFigureOut">
               <a:rPr lang="en-US" smtClean="0"/>
-              <a:t>1/17/2022</a:t>
+              <a:t>2/24/2022</a:t>
             </a:fld>
             <a:endParaRPr lang="en-US"/>
           </a:p>
@@ -5295,7 +5295,7 @@
           <a:p>
             <a:r>
               <a:rPr lang="en-US" dirty="0"/>
-              <a:t>With Standard Deviation</a:t>
+              <a:t>With Standard Deviation (delayed)</a:t>
             </a:r>
             <a:br>
               <a:rPr lang="en-US" dirty="0"/>
@@ -8633,14 +8633,14 @@
           <p:nvPr>
             <p:extLst>
               <p:ext uri="{D42A27DB-BD31-4B8C-83A1-F6EECF244321}">
-                <p14:modId xmlns:p14="http://schemas.microsoft.com/office/powerpoint/2010/main" val="2116028708"/>
+                <p14:modId xmlns:p14="http://schemas.microsoft.com/office/powerpoint/2010/main" val="3442422436"/>
               </p:ext>
             </p:extLst>
           </p:nvPr>
         </p:nvGraphicFramePr>
         <p:xfrm>
-          <a:off x="5279841" y="1576734"/>
-          <a:ext cx="6727860" cy="3017520"/>
+          <a:off x="5113915" y="1608429"/>
+          <a:ext cx="6727860" cy="3657600"/>
         </p:xfrm>
         <a:graphic>
           <a:graphicData uri="http://schemas.openxmlformats.org/drawingml/2006/table">
@@ -8983,6 +8983,79 @@
                   </a:ext>
                 </a:extLst>
               </a:tr>
+              <a:tr h="370840">
+                <a:tc>
+                  <a:txBody>
+                    <a:bodyPr/>
+                    <a:lstStyle/>
+                    <a:p>
+                      <a:r>
+                        <a:rPr lang="en-US" dirty="0"/>
+                        <a:t>Network 3</a:t>
+                      </a:r>
+                    </a:p>
+                    <a:p>
+                      <a:r>
+                        <a:rPr lang="en-US" dirty="0"/>
+                        <a:t>0.16s reaction</a:t>
+                      </a:r>
+                    </a:p>
+                  </a:txBody>
+                  <a:tcPr/>
+                </a:tc>
+                <a:tc>
+                  <a:txBody>
+                    <a:bodyPr/>
+                    <a:lstStyle/>
+                    <a:p>
+                      <a:r>
+                        <a:rPr lang="en-US" b="1" dirty="0"/>
+                        <a:t>Reflex Network</a:t>
+                      </a:r>
+                    </a:p>
+                  </a:txBody>
+                  <a:tcPr/>
+                </a:tc>
+                <a:tc>
+                  <a:txBody>
+                    <a:bodyPr/>
+                    <a:lstStyle/>
+                    <a:p>
+                      <a:r>
+                        <a:rPr lang="en-US" b="1" dirty="0"/>
+                        <a:t>95.3</a:t>
+                      </a:r>
+                    </a:p>
+                    <a:p>
+                      <a:r>
+                        <a:rPr lang="en-US" b="0" dirty="0"/>
+                        <a:t>Original</a:t>
+                      </a:r>
+                      <a:r>
+                        <a:rPr lang="en-US" b="0"/>
+                        <a:t>: 84.97</a:t>
+                      </a:r>
+                      <a:endParaRPr lang="en-US" b="0" dirty="0"/>
+                    </a:p>
+                  </a:txBody>
+                  <a:tcPr/>
+                </a:tc>
+                <a:tc>
+                  <a:txBody>
+                    <a:bodyPr/>
+                    <a:lstStyle/>
+                    <a:p>
+                      <a:endParaRPr lang="en-US" b="1" dirty="0"/>
+                    </a:p>
+                  </a:txBody>
+                  <a:tcPr/>
+                </a:tc>
+                <a:extLst>
+                  <a:ext uri="{0D108BD9-81ED-4DB2-BD59-A6C34878D82A}">
+                    <a16:rowId xmlns:a16="http://schemas.microsoft.com/office/drawing/2014/main" val="2689995730"/>
+                  </a:ext>
+                </a:extLst>
+              </a:tr>
             </a:tbl>
           </a:graphicData>
         </a:graphic>
@@ -9001,7 +9074,7 @@
         </p:nvSpPr>
         <p:spPr>
           <a:xfrm>
-            <a:off x="5891602" y="4629373"/>
+            <a:off x="6359654" y="5753974"/>
             <a:ext cx="5950173" cy="923330"/>
           </a:xfrm>
           <a:prstGeom prst="rect">

</xml_diff>